<commit_message>
Fixed the formula page.
</commit_message>
<xml_diff>
--- a/talks/introduction.pptx
+++ b/talks/introduction.pptx
@@ -5,7 +5,7 @@
     <p:sldMasterId id="2147483648" r:id="rId1"/>
   </p:sldMasterIdLst>
   <p:notesMasterIdLst>
-    <p:NotesMasterId r:id="rId11"/>
+    <p:NotesMasterId r:id="rId12"/>
   </p:notesMasterIdLst>
   <p:sldIdLst>
     <p:sldId id="256" r:id="rId2"/>
@@ -17,6 +17,7 @@
     <p:sldId id="262" r:id="rId8"/>
     <p:sldId id="263" r:id="rId9"/>
     <p:sldId id="264" r:id="rId10"/>
+    <p:sldId id="265" r:id="rId11"/>
   </p:sldIdLst>
   <p:sldSz cx="9144000" cy="6858000" type="screen4x3"/>
   <p:notesSz cx="6858000" cy="9144000"/>
@@ -7884,8 +7885,1604 @@
 </p:notes>
 </file>
 
-<file path=ppt/notesSlides/notesSlide8.xml><?xml version="1.0" encoding="UTF-8"?>
-<p:notes xmlns:a="http://schemas.openxmlformats.org/drawingml/2006/main" xmlns:r="http://schemas.openxmlformats.org/officeDocument/2006/relationships" xmlns:p="http://schemas.openxmlformats.org/presentationml/2006/main"><p:cSld><p:spTree><p:nvGrpSpPr><p:cNvPr id="1" name="" /><p:cNvGrpSpPr /><p:nvPr /></p:nvGrpSpPr><p:grpSpPr><a:xfrm><a:off x="0" y="0" /><a:ext cx="0" cy="0" /><a:chOff x="0" y="0" /><a:chExt cx="0" cy="0" /></a:xfrm></p:grpSpPr><p:sp><p:nvSpPr><p:cNvPr id="2" name="Slide Image Placeholder 1" /><p:cNvSpPr><a:spLocks noGrp="1" noRot="1" noChangeAspect="1" /></p:cNvSpPr><p:nvPr><p:ph type="sldImg" /></p:nvPr></p:nvSpPr><p:spPr /></p:sp><p:sp><p:nvSpPr><p:cNvPr id="3" name="Notes Placeholder 2" /><p:cNvSpPr><a:spLocks noGrp="1" /></p:cNvSpPr><p:nvPr><p:ph type="body" idx="1" /></p:nvPr></p:nvSpPr><p:spPr /><p:txBody><a:bodyPr /><a:lstStyle /><a:p><a:pPr lvl="0" marL="0" indent="0"><a:buNone /></a:pPr><a:r><a:rPr /><a:t>In</a:t></a:r><a:r><a:rPr /><a:t> </a:t></a:r><a:r><a:rPr /><a:t>Statistics,</a:t></a:r><a:r><a:rPr /><a:t> </a:t></a:r><a:r><a:rPr /><a:t>you</a:t></a:r><a:r><a:rPr /><a:t> </a:t></a:r><a:r><a:rPr /><a:t>often</a:t></a:r><a:r><a:rPr /><a:t> </a:t></a:r><a:r><a:rPr /><a:t>see</a:t></a:r><a:r><a:rPr /><a:t> </a:t></a:r><a:r><a:rPr /><a:t>the</a:t></a:r><a:r><a:rPr /><a:t> </a:t></a:r><a:r><a:rPr /><a:t>Greek</a:t></a:r><a:r><a:rPr /><a:t> </a:t></a:r><a:r><a:rPr /><a:t>letter</a:t></a:r><a:r><a:rPr /><a:t> </a:t></a:r><a14:m><m:oMath xmlns:m="http://schemas.openxmlformats.org/officeDocument/2006/math"><m:r><m:t>Σ</m:t></m:r></m:oMath></a14:m><a:r><a:rPr /><a:t> </a:t></a:r><a:r><a:rPr /><a:t>in</a:t></a:r><a:r><a:rPr /><a:t> </a:t></a:r><a:r><a:rPr /><a:t>various</a:t></a:r><a:r><a:rPr /><a:t> </a:t></a:r><a:r><a:rPr /><a:t>formulas.</a:t></a:r></a:p><a:p><a:pPr lvl="0" marL="0" indent="0"><a:buNone /></a:pPr></a:p><a:p><a:pPr lvl="0" marL="0" indent="0"><a:buNone /></a:pPr><a:r><a:rPr /><a:t>The</a:t></a:r><a:r><a:rPr /><a:t> </a:t></a:r><a:r><a:rPr /><a:t>advantage</a:t></a:r><a:r><a:rPr /><a:t> </a:t></a:r><a:r><a:rPr /><a:t>that</a:t></a:r><a:r><a:rPr /><a:t> </a:t></a:r><a:r><a:rPr /><a:t>I</a:t></a:r><a:r><a:rPr /><a:t> </a:t></a:r><a:r><a:rPr /><a:t>am</a:t></a:r><a:r><a:rPr /><a:t> </a:t></a:r><a:r><a:rPr /><a:t>most</a:t></a:r><a:r><a:rPr /><a:t> </a:t></a:r><a:r><a:rPr /><a:t>interested</a:t></a:r><a:r><a:rPr /><a:t> </a:t></a:r><a:r><a:rPr /><a:t>in</a:t></a:r><a:r><a:rPr /><a:t> </a:t></a:r><a:r><a:rPr /><a:t>is</a:t></a:r><a:r><a:rPr /><a:t> </a:t></a:r><a:r><a:rPr /><a:t>the</a:t></a:r><a:r><a:rPr /><a:t> </a:t></a:r><a:r><a:rPr /><a:t>ability</a:t></a:r><a:r><a:rPr /><a:t> </a:t></a:r><a:r><a:rPr /><a:t>of</a:t></a:r><a:r><a:rPr /><a:t> </a:t></a:r><a:r><a:rPr /><a:t>a</a:t></a:r><a:r><a:rPr /><a:t> </a:t></a:r><a:r><a:rPr /><a:t>computer</a:t></a:r><a:r><a:rPr /><a:t> </a:t></a:r><a:r><a:rPr /><a:t>cluster</a:t></a:r><a:r><a:rPr /><a:t> </a:t></a:r><a:r><a:rPr /><a:t>to</a:t></a:r><a:r><a:rPr /><a:t> </a:t></a:r><a:r><a:rPr /><a:t>process</a:t></a:r><a:r><a:rPr /><a:t> </a:t></a:r><a:r><a:rPr /><a:t>tasks</a:t></a:r><a:r><a:rPr /><a:t> </a:t></a:r><a:r><a:rPr /><a:t>in</a:t></a:r><a:r><a:rPr /><a:t> </a:t></a:r><a:r><a:rPr /><a:t>parallel.</a:t></a:r><a:r><a:rPr /><a:t> </a:t></a:r><a:r><a:rPr /><a:t>These</a:t></a:r><a:r><a:rPr /><a:t> </a:t></a:r><a:r><a:rPr /><a:t>images</a:t></a:r><a:r><a:rPr /><a:t> </a:t></a:r><a:r><a:rPr /><a:t>of</a:t></a:r><a:r><a:rPr /><a:t> </a:t></a:r><a:r><a:rPr /><a:t>a</a:t></a:r><a:r><a:rPr /><a:t> </a:t></a:r><a:r><a:rPr /><a:t>row</a:t></a:r><a:r><a:rPr /><a:t> </a:t></a:r><a:r><a:rPr /><a:t>of</a:t></a:r><a:r><a:rPr /><a:t> </a:t></a:r><a:r><a:rPr /><a:t>threshers</a:t></a:r><a:r><a:rPr /><a:t> </a:t></a:r><a:r><a:rPr /><a:t>harvesting</a:t></a:r><a:r><a:rPr /><a:t> </a:t></a:r><a:r><a:rPr /><a:t>a</a:t></a:r><a:r><a:rPr /><a:t> </a:t></a:r><a:r><a:rPr /><a:t>wheat</a:t></a:r><a:r><a:rPr /><a:t> </a:t></a:r><a:r><a:rPr /><a:t>field</a:t></a:r><a:r><a:rPr /><a:t> </a:t></a:r><a:r><a:rPr /><a:t>and</a:t></a:r><a:r><a:rPr /><a:t> </a:t></a:r><a:r><a:rPr /><a:t>a</a:t></a:r><a:r><a:rPr /><a:t> </a:t></a:r><a:r><a:rPr /><a:t>large</a:t></a:r><a:r><a:rPr /><a:t> </a:t></a:r><a:r><a:rPr /><a:t>group</a:t></a:r><a:r><a:rPr /><a:t> </a:t></a:r><a:r><a:rPr /><a:t>of</a:t></a:r><a:r><a:rPr /><a:t> </a:t></a:r><a:r><a:rPr /><a:t>workers</a:t></a:r><a:r><a:rPr /><a:t> </a:t></a:r><a:r><a:rPr /><a:t>at</a:t></a:r><a:r><a:rPr /><a:t> </a:t></a:r><a:r><a:rPr /><a:t>a</a:t></a:r><a:r><a:rPr /><a:t> </a:t></a:r><a:r><a:rPr /><a:t>barn</a:t></a:r><a:r><a:rPr /><a:t> </a:t></a:r><a:r><a:rPr /><a:t>raising</a:t></a:r><a:r><a:rPr /><a:t> </a:t></a:r><a:r><a:rPr /><a:t>illustrate</a:t></a:r><a:r><a:rPr /><a:t> </a:t></a:r><a:r><a:rPr /><a:t>the</a:t></a:r><a:r><a:rPr /><a:t> </a:t></a:r><a:r><a:rPr /><a:t>benefit</a:t></a:r><a:r><a:rPr /><a:t> </a:t></a:r><a:r><a:rPr /><a:t>of</a:t></a:r><a:r><a:rPr /><a:t> </a:t></a:r><a:r><a:rPr /><a:t>splitting</a:t></a:r><a:r><a:rPr /><a:t> </a:t></a:r><a:r><a:rPr /><a:t>a</a:t></a:r><a:r><a:rPr /><a:t> </a:t></a:r><a:r><a:rPr /><a:t>large</a:t></a:r><a:r><a:rPr /><a:t> </a:t></a:r><a:r><a:rPr /><a:t>task</a:t></a:r><a:r><a:rPr /><a:t> </a:t></a:r><a:r><a:rPr /><a:t>into</a:t></a:r><a:r><a:rPr /><a:t> </a:t></a:r><a:r><a:rPr /><a:t>small</a:t></a:r><a:r><a:rPr /><a:t> </a:t></a:r><a:r><a:rPr /><a:t>pieces</a:t></a:r><a:r><a:rPr /><a:t> </a:t></a:r><a:r><a:rPr /><a:t>that</a:t></a:r><a:r><a:rPr /><a:t> </a:t></a:r><a:r><a:rPr /><a:t>are</a:t></a:r><a:r><a:rPr /><a:t> </a:t></a:r><a:r><a:rPr /><a:t>run</a:t></a:r><a:r><a:rPr /><a:t> </a:t></a:r><a:r><a:rPr /><a:t>simultaneously.</a:t></a:r></a:p><a:p><a:pPr lvl="0" marL="0" indent="0"><a:buNone /></a:pPr></a:p><a:p><a:pPr lvl="0" marL="0" indent="0"><a:buNone /></a:pPr><a:r><a:rPr /><a:t>This</a:t></a:r><a:r><a:rPr /><a:t> </a:t></a:r><a:r><a:rPr /><a:t>is</a:t></a:r><a:r><a:rPr /><a:t> </a:t></a:r><a:r><a:rPr /><a:t>the</a:t></a:r><a:r><a:rPr /><a:t> </a:t></a:r><a:r><a:rPr /><a:t>computer</a:t></a:r><a:r><a:rPr /><a:t> </a:t></a:r><a:r><a:rPr /><a:t>equivalent</a:t></a:r><a:r><a:rPr /><a:t> </a:t></a:r><a:r><a:rPr /><a:t>of</a:t></a:r><a:r><a:rPr /><a:t> </a:t></a:r><a:r><a:rPr /><a:t>the</a:t></a:r><a:r><a:rPr /><a:t> </a:t></a:r><a:r><a:rPr /><a:t>old</a:t></a:r><a:r><a:rPr /><a:t> </a:t></a:r><a:r><a:rPr /><a:t>phrase</a:t></a:r><a:r><a:rPr /><a:t> </a:t></a:r><a:r><a:rPr /><a:t>“</a:t></a:r><a:r><a:rPr /><a:t>Many</a:t></a:r><a:r><a:rPr /><a:t> </a:t></a:r><a:r><a:rPr /><a:t>hands</a:t></a:r><a:r><a:rPr /><a:t> </a:t></a:r><a:r><a:rPr /><a:t>make</a:t></a:r><a:r><a:rPr /><a:t> </a:t></a:r><a:r><a:rPr /><a:t>light</a:t></a:r><a:r><a:rPr /><a:t> </a:t></a:r><a:r><a:rPr /><a:t>work</a:t></a:r><a:r><a:rPr /><a:t>”</a:t></a:r><a:r><a:rPr /><a:t> </a:t></a:r><a:r><a:rPr /><a:t>which</a:t></a:r><a:r><a:rPr /><a:t> </a:t></a:r><a:r><a:rPr /><a:t>can</a:t></a:r><a:r><a:rPr /><a:t> </a:t></a:r><a:r><a:rPr /><a:t>be</a:t></a:r><a:r><a:rPr /><a:t> </a:t></a:r><a:r><a:rPr /><a:t>traced</a:t></a:r><a:r><a:rPr /><a:t> </a:t></a:r><a:r><a:rPr /><a:t>all</a:t></a:r><a:r><a:rPr /><a:t> </a:t></a:r><a:r><a:rPr /><a:t>the</a:t></a:r><a:r><a:rPr /><a:t> </a:t></a:r><a:r><a:rPr /><a:t>way</a:t></a:r><a:r><a:rPr /><a:t> </a:t></a:r><a:r><a:rPr /><a:t>back</a:t></a:r><a:r><a:rPr /><a:t> </a:t></a:r><a:r><a:rPr /><a:t>to</a:t></a:r><a:r><a:rPr /><a:t> </a:t></a:r><a:r><a:rPr /><a:t>the</a:t></a:r><a:r><a:rPr /><a:t> </a:t></a:r><a:r><a:rPr /><a:t>early</a:t></a:r><a:r><a:rPr /><a:t> </a:t></a:r><a:r><a:rPr /><a:t>1300s,</a:t></a:r><a:r><a:rPr /><a:t> </a:t></a:r><a:r><a:rPr /><a:t>according</a:t></a:r><a:r><a:rPr /><a:t> </a:t></a:r><a:r><a:rPr /><a:t>to</a:t></a:r><a:r><a:rPr /><a:t> </a:t></a:r><a:r><a:rPr /><a:t>dictionary.com.</a:t></a:r></a:p><a:p><a:pPr lvl="0" marL="0" indent="0"><a:buNone /></a:pPr></a:p><a:p><a:pPr lvl="0" marL="0" indent="0"><a:buNone /></a:pPr><a:r><a:rPr /><a:t>You</a:t></a:r><a:r><a:rPr /><a:t> </a:t></a:r><a:r><a:rPr /><a:t>can</a:t></a:r><a:r><a:rPr /><a:t> </a:t></a:r><a:r><a:rPr /><a:t>find</a:t></a:r><a:r><a:rPr /><a:t> </a:t></a:r><a:r><a:rPr /><a:t>this</a:t></a:r><a:r><a:rPr /><a:t> </a:t></a:r><a:r><a:rPr /><a:t>image</a:t></a:r><a:r><a:rPr /><a:t> </a:t></a:r><a:r><a:rPr /><a:t>at</a:t></a:r><a:r><a:rPr /><a:t> </a:t></a:r><a:r><a:rPr /><a:t>the</a:t></a:r><a:r><a:rPr /><a:t> </a:t></a:r><a:r><a:rPr /><a:t>Lawrence</a:t></a:r><a:r><a:rPr /><a:t> </a:t></a:r><a:r><a:rPr /><a:t>Livermore</a:t></a:r><a:r><a:rPr /><a:t> </a:t></a:r><a:r><a:rPr /><a:t>Naitonal</a:t></a:r><a:r><a:rPr /><a:t> </a:t></a:r><a:r><a:rPr /><a:t>Laboratory</a:t></a:r><a:r><a:rPr /><a:t> </a:t></a:r><a:r><a:rPr /><a:t>website,</a:t></a:r><a:r><a:rPr /><a:t> </a:t></a:r><a:r><a:rPr /><a:t>in</a:t></a:r><a:r><a:rPr /><a:t> </a:t></a:r><a:r><a:rPr /><a:t>a</a:t></a:r><a:r><a:rPr /><a:t> </a:t></a:r><a:r><a:rPr /><a:t>tutorial</a:t></a:r><a:r><a:rPr /><a:t> </a:t></a:r><a:r><a:rPr /><a:t>article</a:t></a:r><a:r><a:rPr /><a:t> </a:t></a:r><a:r><a:rPr /><a:t>on</a:t></a:r><a:r><a:rPr /><a:t> </a:t></a:r><a:r><a:rPr /><a:t>parallel</a:t></a:r><a:r><a:rPr /><a:t> </a:t></a:r><a:r><a:rPr /><a:t>computing</a:t></a:r><a:r><a:rPr /><a:t> </a:t></a:r><a:r><a:rPr /><a:t>written</a:t></a:r><a:r><a:rPr /><a:t> </a:t></a:r><a:r><a:rPr /><a:t>by</a:t></a:r><a:r><a:rPr /><a:t> </a:t></a:r><a:r><a:rPr /><a:t>Blaise</a:t></a:r><a:r><a:rPr /><a:t> </a:t></a:r><a:r><a:rPr /><a:t>Barney</a:t></a:r><a:r><a:rPr /><a:t> </a:t></a:r><a:r><a:rPr /><a:t>(</a:t></a:r><a:r><a:rPr /><a:t>https://computing.llnl.gov/tutorials/parallel_comp/</a:t></a:r><a:r><a:rPr /><a:t>).</a:t></a:r><a:r><a:rPr /><a:t> </a:t></a:r><a:r><a:rPr /><a:t>The</a:t></a:r><a:r><a:rPr /><a:t> </a:t></a:r><a:r><a:rPr /><a:t>article</a:t></a:r><a:r><a:rPr /><a:t> </a:t></a:r><a:r><a:rPr /><a:t>is</a:t></a:r><a:r><a:rPr /><a:t> </a:t></a:r><a:r><a:rPr /><a:t>copyrighted,</a:t></a:r><a:r><a:rPr /><a:t> </a:t></a:r><a:r><a:rPr /><a:t>and</a:t></a:r><a:r><a:rPr /><a:t> </a:t></a:r><a:r><a:rPr /><a:t>the</a:t></a:r><a:r><a:rPr /><a:t> </a:t></a:r><a:r><a:rPr /><a:t>excerpt</a:t></a:r><a:r><a:rPr /><a:t> </a:t></a:r><a:r><a:rPr /><a:t>used</a:t></a:r><a:r><a:rPr /><a:t> </a:t></a:r><a:r><a:rPr /><a:t>here</a:t></a:r><a:r><a:rPr /><a:t> </a:t></a:r><a:r><a:rPr /><a:t>is</a:t></a:r><a:r><a:rPr /><a:t> </a:t></a:r><a:r><a:rPr /><a:t>covered</a:t></a:r><a:r><a:rPr /><a:t> </a:t></a:r><a:r><a:rPr /><a:t>under</a:t></a:r><a:r><a:rPr /><a:t> </a:t></a:r><a:r><a:rPr /><a:t>the</a:t></a:r><a:r><a:rPr /><a:t> </a:t></a:r><a:r><a:rPr /><a:t>fair</a:t></a:r><a:r><a:rPr /><a:t> </a:t></a:r><a:r><a:rPr /><a:t>use</a:t></a:r><a:r><a:rPr /><a:t> </a:t></a:r><a:r><a:rPr /><a:t>provisions</a:t></a:r><a:r><a:rPr /><a:t> </a:t></a:r><a:r><a:rPr /><a:t>of</a:t></a:r><a:r><a:rPr /><a:t> </a:t></a:r><a:r><a:rPr /><a:t>copyright</a:t></a:r><a:r><a:rPr /><a:t> </a:t></a:r><a:r><a:rPr /><a:t>law.</a:t></a:r></a:p><a:p><a:pPr lvl="0" marL="0" indent="0"><a:buNone /></a:pPr></a:p><a:p><a:pPr lvl="0" marL="0" indent="0"><a:spcBef><a:spcPts val="3000" /></a:spcBef><a:buNone /></a:pPr><a:r><a:rPr b="1" /><a:t>Where</a:t></a:r><a:r><a:rPr b="1" /><a:t> </a:t></a:r><a:r><a:rPr b="1" /><a:t>parallel</a:t></a:r><a:r><a:rPr b="1" /><a:t> </a:t></a:r><a:r><a:rPr b="1" /><a:t>computing</a:t></a:r><a:r><a:rPr b="1" /><a:t> </a:t></a:r><a:r><a:rPr b="1" /><a:t>helps</a:t></a:r></a:p><a:p><a:pPr lvl="0" marL="0" indent="0"><a:buNone /></a:pPr></a:p><a:p><a:pPr lvl="0" marL="0" indent="0"><a:buNone /></a:pPr><a:r><a:rPr /><a:t>Some</a:t></a:r><a:r><a:rPr /><a:t> </a:t></a:r><a:r><a:rPr /><a:t>of</a:t></a:r><a:r><a:rPr /><a:t> </a:t></a:r><a:r><a:rPr /><a:t>the</a:t></a:r><a:r><a:rPr /><a:t> </a:t></a:r><a:r><a:rPr /><a:t>most</a:t></a:r><a:r><a:rPr /><a:t> </a:t></a:r><a:r><a:rPr /><a:t>fundamental</a:t></a:r><a:r><a:rPr /><a:t> </a:t></a:r><a:r><a:rPr /><a:t>statistcal</a:t></a:r><a:r><a:rPr /><a:t> </a:t></a:r><a:r><a:rPr /><a:t>summaries</a:t></a:r><a:r><a:rPr /><a:t> </a:t></a:r><a:r><a:rPr /><a:t>in</a:t></a:r><a:r><a:rPr /><a:t> </a:t></a:r><a:r><a:rPr /><a:t>statistics</a:t></a:r><a:r><a:rPr /><a:t> </a:t></a:r><a:r><a:rPr /><a:t>are</a:t></a:r><a:r><a:rPr /><a:t> </a:t></a:r><a:r><a:rPr /><a:t>easily</a:t></a:r><a:r><a:rPr /><a:t> </a:t></a:r><a:r><a:rPr /><a:t>split</a:t></a:r><a:r><a:rPr /><a:t> </a:t></a:r><a:r><a:rPr /><a:t>into</a:t></a:r><a:r><a:rPr /><a:t> </a:t></a:r><a:r><a:rPr /><a:t>small</a:t></a:r><a:r><a:rPr /><a:t> </a:t></a:r><a:r><a:rPr /><a:t>pieces.</a:t></a:r></a:p><a:p><a:pPr lvl="0" marL="0" indent="0"><a:buNone /></a:pPr></a:p><a:p><a:pPr lvl="0" marL="0" indent="0"><a:buNone /></a:pPr><a14:m><m:oMath xmlns:m="http://schemas.openxmlformats.org/officeDocument/2006/math"><m:bar><m:barPr><m:pos m:val="top" /></m:barPr><m:e><m:r><m:t>X</m:t></m:r></m:e></m:bar><m:r><m:t>=</m:t></m:r><m:f><m:fPr><m:type m:val="bar" /></m:fPr><m:num><m:r><m:t>1</m:t></m:r></m:num><m:den><m:r><m:t>n</m:t></m:r></m:den></m:f><m:sSub><m:e><m:r><m:t>Σ</m:t></m:r></m:e><m:sub><m:r><m:t>i</m:t></m:r></m:sub></m:sSub><m:sSub><m:e><m:r><m:t>X</m:t></m:r></m:e><m:sub><m:r><m:t>i</m:t></m:r></m:sub></m:sSub></m:oMath></a14:m></a:p></p:txBody></p:sp><p:sp><p:nvSpPr><p:cNvPr id="4" name="Slide Number Placeholder 3" /><p:cNvSpPr><a:spLocks noGrp="1" /></p:cNvSpPr><p:nvPr><p:ph type="sldNum" sz="quarter" idx="10" /></p:nvPr></p:nvSpPr><p:spPr /><p:txBody><a:bodyPr /><a:lstStyle /><a:p><a:fld id="{18BDFEC3-8487-43E8-A154-7C12CBC1FFF2}" type="slidenum"><a:rPr lang="en-US" /><a:t>9</a:t></a:fld><a:endParaRPr lang="en-US" /></a:p></p:txBody></p:sp></p:spTree></p:cSld></p:notes>
+<file path=ppt/notesSlides/notesSlide8.xml><?xml version="1.0" encoding="utf-8"?>
+<p:notes xmlns:a="http://schemas.openxmlformats.org/drawingml/2006/main" xmlns:r="http://schemas.openxmlformats.org/officeDocument/2006/relationships" xmlns:p="http://schemas.openxmlformats.org/presentationml/2006/main">
+  <p:cSld>
+    <p:spTree>
+      <p:nvGrpSpPr>
+        <p:cNvPr id="1" name=""/>
+        <p:cNvGrpSpPr/>
+        <p:nvPr/>
+      </p:nvGrpSpPr>
+      <p:grpSpPr>
+        <a:xfrm>
+          <a:off x="0" y="0"/>
+          <a:ext cx="0" cy="0"/>
+          <a:chOff x="0" y="0"/>
+          <a:chExt cx="0" cy="0"/>
+        </a:xfrm>
+      </p:grpSpPr>
+      <p:sp>
+        <p:nvSpPr>
+          <p:cNvPr id="2" name="Slide Image Placeholder 1"/>
+          <p:cNvSpPr>
+            <a:spLocks noGrp="1" noRot="1" noChangeAspect="1"/>
+          </p:cNvSpPr>
+          <p:nvPr>
+            <p:ph type="sldImg"/>
+          </p:nvPr>
+        </p:nvSpPr>
+        <p:spPr/>
+      </p:sp>
+      <p:sp>
+        <p:nvSpPr>
+          <p:cNvPr id="3" name="Notes Placeholder 2"/>
+          <p:cNvSpPr>
+            <a:spLocks noGrp="1"/>
+          </p:cNvSpPr>
+          <p:nvPr>
+            <p:ph type="body" idx="1"/>
+          </p:nvPr>
+        </p:nvSpPr>
+        <p:spPr/>
+        <p:txBody>
+          <a:bodyPr/>
+          <a:lstStyle/>
+          <a:p>
+            <a:pPr lvl="0" marL="0" indent="0">
+              <a:buNone/>
+            </a:pPr>
+            <a:r>
+              <a:rPr/>
+              <a:t>The</a:t>
+            </a:r>
+            <a:r>
+              <a:rPr/>
+              <a:t> </a:t>
+            </a:r>
+            <a:r>
+              <a:rPr/>
+              <a:t>advantage</a:t>
+            </a:r>
+            <a:r>
+              <a:rPr/>
+              <a:t> </a:t>
+            </a:r>
+            <a:r>
+              <a:rPr/>
+              <a:t>that</a:t>
+            </a:r>
+            <a:r>
+              <a:rPr/>
+              <a:t> </a:t>
+            </a:r>
+            <a:r>
+              <a:rPr/>
+              <a:t>I</a:t>
+            </a:r>
+            <a:r>
+              <a:rPr/>
+              <a:t> </a:t>
+            </a:r>
+            <a:r>
+              <a:rPr/>
+              <a:t>am</a:t>
+            </a:r>
+            <a:r>
+              <a:rPr/>
+              <a:t> </a:t>
+            </a:r>
+            <a:r>
+              <a:rPr/>
+              <a:t>most</a:t>
+            </a:r>
+            <a:r>
+              <a:rPr/>
+              <a:t> </a:t>
+            </a:r>
+            <a:r>
+              <a:rPr/>
+              <a:t>interested</a:t>
+            </a:r>
+            <a:r>
+              <a:rPr/>
+              <a:t> </a:t>
+            </a:r>
+            <a:r>
+              <a:rPr/>
+              <a:t>in</a:t>
+            </a:r>
+            <a:r>
+              <a:rPr/>
+              <a:t> </a:t>
+            </a:r>
+            <a:r>
+              <a:rPr/>
+              <a:t>is</a:t>
+            </a:r>
+            <a:r>
+              <a:rPr/>
+              <a:t> </a:t>
+            </a:r>
+            <a:r>
+              <a:rPr/>
+              <a:t>the</a:t>
+            </a:r>
+            <a:r>
+              <a:rPr/>
+              <a:t> </a:t>
+            </a:r>
+            <a:r>
+              <a:rPr/>
+              <a:t>ability</a:t>
+            </a:r>
+            <a:r>
+              <a:rPr/>
+              <a:t> </a:t>
+            </a:r>
+            <a:r>
+              <a:rPr/>
+              <a:t>of</a:t>
+            </a:r>
+            <a:r>
+              <a:rPr/>
+              <a:t> </a:t>
+            </a:r>
+            <a:r>
+              <a:rPr/>
+              <a:t>a</a:t>
+            </a:r>
+            <a:r>
+              <a:rPr/>
+              <a:t> </a:t>
+            </a:r>
+            <a:r>
+              <a:rPr/>
+              <a:t>computer</a:t>
+            </a:r>
+            <a:r>
+              <a:rPr/>
+              <a:t> </a:t>
+            </a:r>
+            <a:r>
+              <a:rPr/>
+              <a:t>cluster</a:t>
+            </a:r>
+            <a:r>
+              <a:rPr/>
+              <a:t> </a:t>
+            </a:r>
+            <a:r>
+              <a:rPr/>
+              <a:t>to</a:t>
+            </a:r>
+            <a:r>
+              <a:rPr/>
+              <a:t> </a:t>
+            </a:r>
+            <a:r>
+              <a:rPr/>
+              <a:t>process</a:t>
+            </a:r>
+            <a:r>
+              <a:rPr/>
+              <a:t> </a:t>
+            </a:r>
+            <a:r>
+              <a:rPr/>
+              <a:t>tasks</a:t>
+            </a:r>
+            <a:r>
+              <a:rPr/>
+              <a:t> </a:t>
+            </a:r>
+            <a:r>
+              <a:rPr/>
+              <a:t>in</a:t>
+            </a:r>
+            <a:r>
+              <a:rPr/>
+              <a:t> </a:t>
+            </a:r>
+            <a:r>
+              <a:rPr/>
+              <a:t>parallel.</a:t>
+            </a:r>
+            <a:r>
+              <a:rPr/>
+              <a:t> </a:t>
+            </a:r>
+            <a:r>
+              <a:rPr/>
+              <a:t>These</a:t>
+            </a:r>
+            <a:r>
+              <a:rPr/>
+              <a:t> </a:t>
+            </a:r>
+            <a:r>
+              <a:rPr/>
+              <a:t>images</a:t>
+            </a:r>
+            <a:r>
+              <a:rPr/>
+              <a:t> </a:t>
+            </a:r>
+            <a:r>
+              <a:rPr/>
+              <a:t>of</a:t>
+            </a:r>
+            <a:r>
+              <a:rPr/>
+              <a:t> </a:t>
+            </a:r>
+            <a:r>
+              <a:rPr/>
+              <a:t>a</a:t>
+            </a:r>
+            <a:r>
+              <a:rPr/>
+              <a:t> </a:t>
+            </a:r>
+            <a:r>
+              <a:rPr/>
+              <a:t>row</a:t>
+            </a:r>
+            <a:r>
+              <a:rPr/>
+              <a:t> </a:t>
+            </a:r>
+            <a:r>
+              <a:rPr/>
+              <a:t>of</a:t>
+            </a:r>
+            <a:r>
+              <a:rPr/>
+              <a:t> </a:t>
+            </a:r>
+            <a:r>
+              <a:rPr/>
+              <a:t>threshers</a:t>
+            </a:r>
+            <a:r>
+              <a:rPr/>
+              <a:t> </a:t>
+            </a:r>
+            <a:r>
+              <a:rPr/>
+              <a:t>harvesting</a:t>
+            </a:r>
+            <a:r>
+              <a:rPr/>
+              <a:t> </a:t>
+            </a:r>
+            <a:r>
+              <a:rPr/>
+              <a:t>a</a:t>
+            </a:r>
+            <a:r>
+              <a:rPr/>
+              <a:t> </a:t>
+            </a:r>
+            <a:r>
+              <a:rPr/>
+              <a:t>wheat</a:t>
+            </a:r>
+            <a:r>
+              <a:rPr/>
+              <a:t> </a:t>
+            </a:r>
+            <a:r>
+              <a:rPr/>
+              <a:t>field</a:t>
+            </a:r>
+            <a:r>
+              <a:rPr/>
+              <a:t> </a:t>
+            </a:r>
+            <a:r>
+              <a:rPr/>
+              <a:t>and</a:t>
+            </a:r>
+            <a:r>
+              <a:rPr/>
+              <a:t> </a:t>
+            </a:r>
+            <a:r>
+              <a:rPr/>
+              <a:t>a</a:t>
+            </a:r>
+            <a:r>
+              <a:rPr/>
+              <a:t> </a:t>
+            </a:r>
+            <a:r>
+              <a:rPr/>
+              <a:t>large</a:t>
+            </a:r>
+            <a:r>
+              <a:rPr/>
+              <a:t> </a:t>
+            </a:r>
+            <a:r>
+              <a:rPr/>
+              <a:t>group</a:t>
+            </a:r>
+            <a:r>
+              <a:rPr/>
+              <a:t> </a:t>
+            </a:r>
+            <a:r>
+              <a:rPr/>
+              <a:t>of</a:t>
+            </a:r>
+            <a:r>
+              <a:rPr/>
+              <a:t> </a:t>
+            </a:r>
+            <a:r>
+              <a:rPr/>
+              <a:t>workers</a:t>
+            </a:r>
+            <a:r>
+              <a:rPr/>
+              <a:t> </a:t>
+            </a:r>
+            <a:r>
+              <a:rPr/>
+              <a:t>at</a:t>
+            </a:r>
+            <a:r>
+              <a:rPr/>
+              <a:t> </a:t>
+            </a:r>
+            <a:r>
+              <a:rPr/>
+              <a:t>a</a:t>
+            </a:r>
+            <a:r>
+              <a:rPr/>
+              <a:t> </a:t>
+            </a:r>
+            <a:r>
+              <a:rPr/>
+              <a:t>barn</a:t>
+            </a:r>
+            <a:r>
+              <a:rPr/>
+              <a:t> </a:t>
+            </a:r>
+            <a:r>
+              <a:rPr/>
+              <a:t>raising</a:t>
+            </a:r>
+            <a:r>
+              <a:rPr/>
+              <a:t> </a:t>
+            </a:r>
+            <a:r>
+              <a:rPr/>
+              <a:t>illustrate</a:t>
+            </a:r>
+            <a:r>
+              <a:rPr/>
+              <a:t> </a:t>
+            </a:r>
+            <a:r>
+              <a:rPr/>
+              <a:t>the</a:t>
+            </a:r>
+            <a:r>
+              <a:rPr/>
+              <a:t> </a:t>
+            </a:r>
+            <a:r>
+              <a:rPr/>
+              <a:t>benefit</a:t>
+            </a:r>
+            <a:r>
+              <a:rPr/>
+              <a:t> </a:t>
+            </a:r>
+            <a:r>
+              <a:rPr/>
+              <a:t>of</a:t>
+            </a:r>
+            <a:r>
+              <a:rPr/>
+              <a:t> </a:t>
+            </a:r>
+            <a:r>
+              <a:rPr/>
+              <a:t>splitting</a:t>
+            </a:r>
+            <a:r>
+              <a:rPr/>
+              <a:t> </a:t>
+            </a:r>
+            <a:r>
+              <a:rPr/>
+              <a:t>a</a:t>
+            </a:r>
+            <a:r>
+              <a:rPr/>
+              <a:t> </a:t>
+            </a:r>
+            <a:r>
+              <a:rPr/>
+              <a:t>large</a:t>
+            </a:r>
+            <a:r>
+              <a:rPr/>
+              <a:t> </a:t>
+            </a:r>
+            <a:r>
+              <a:rPr/>
+              <a:t>task</a:t>
+            </a:r>
+            <a:r>
+              <a:rPr/>
+              <a:t> </a:t>
+            </a:r>
+            <a:r>
+              <a:rPr/>
+              <a:t>into</a:t>
+            </a:r>
+            <a:r>
+              <a:rPr/>
+              <a:t> </a:t>
+            </a:r>
+            <a:r>
+              <a:rPr/>
+              <a:t>small</a:t>
+            </a:r>
+            <a:r>
+              <a:rPr/>
+              <a:t> </a:t>
+            </a:r>
+            <a:r>
+              <a:rPr/>
+              <a:t>pieces</a:t>
+            </a:r>
+            <a:r>
+              <a:rPr/>
+              <a:t> </a:t>
+            </a:r>
+            <a:r>
+              <a:rPr/>
+              <a:t>that</a:t>
+            </a:r>
+            <a:r>
+              <a:rPr/>
+              <a:t> </a:t>
+            </a:r>
+            <a:r>
+              <a:rPr/>
+              <a:t>are</a:t>
+            </a:r>
+            <a:r>
+              <a:rPr/>
+              <a:t> </a:t>
+            </a:r>
+            <a:r>
+              <a:rPr/>
+              <a:t>run</a:t>
+            </a:r>
+            <a:r>
+              <a:rPr/>
+              <a:t> </a:t>
+            </a:r>
+            <a:r>
+              <a:rPr/>
+              <a:t>simultaneously.</a:t>
+            </a:r>
+          </a:p>
+          <a:p>
+            <a:pPr lvl="0" marL="0" indent="0">
+              <a:buNone/>
+            </a:pPr>
+          </a:p>
+          <a:p>
+            <a:pPr lvl="0" marL="0" indent="0">
+              <a:buNone/>
+            </a:pPr>
+            <a:r>
+              <a:rPr/>
+              <a:t>This</a:t>
+            </a:r>
+            <a:r>
+              <a:rPr/>
+              <a:t> </a:t>
+            </a:r>
+            <a:r>
+              <a:rPr/>
+              <a:t>is</a:t>
+            </a:r>
+            <a:r>
+              <a:rPr/>
+              <a:t> </a:t>
+            </a:r>
+            <a:r>
+              <a:rPr/>
+              <a:t>the</a:t>
+            </a:r>
+            <a:r>
+              <a:rPr/>
+              <a:t> </a:t>
+            </a:r>
+            <a:r>
+              <a:rPr/>
+              <a:t>computer</a:t>
+            </a:r>
+            <a:r>
+              <a:rPr/>
+              <a:t> </a:t>
+            </a:r>
+            <a:r>
+              <a:rPr/>
+              <a:t>equivalent</a:t>
+            </a:r>
+            <a:r>
+              <a:rPr/>
+              <a:t> </a:t>
+            </a:r>
+            <a:r>
+              <a:rPr/>
+              <a:t>of</a:t>
+            </a:r>
+            <a:r>
+              <a:rPr/>
+              <a:t> </a:t>
+            </a:r>
+            <a:r>
+              <a:rPr/>
+              <a:t>the</a:t>
+            </a:r>
+            <a:r>
+              <a:rPr/>
+              <a:t> </a:t>
+            </a:r>
+            <a:r>
+              <a:rPr/>
+              <a:t>old</a:t>
+            </a:r>
+            <a:r>
+              <a:rPr/>
+              <a:t> </a:t>
+            </a:r>
+            <a:r>
+              <a:rPr/>
+              <a:t>phrase</a:t>
+            </a:r>
+            <a:r>
+              <a:rPr/>
+              <a:t> </a:t>
+            </a:r>
+            <a:r>
+              <a:rPr/>
+              <a:t>“</a:t>
+            </a:r>
+            <a:r>
+              <a:rPr/>
+              <a:t>Many</a:t>
+            </a:r>
+            <a:r>
+              <a:rPr/>
+              <a:t> </a:t>
+            </a:r>
+            <a:r>
+              <a:rPr/>
+              <a:t>hands</a:t>
+            </a:r>
+            <a:r>
+              <a:rPr/>
+              <a:t> </a:t>
+            </a:r>
+            <a:r>
+              <a:rPr/>
+              <a:t>make</a:t>
+            </a:r>
+            <a:r>
+              <a:rPr/>
+              <a:t> </a:t>
+            </a:r>
+            <a:r>
+              <a:rPr/>
+              <a:t>light</a:t>
+            </a:r>
+            <a:r>
+              <a:rPr/>
+              <a:t> </a:t>
+            </a:r>
+            <a:r>
+              <a:rPr/>
+              <a:t>work</a:t>
+            </a:r>
+            <a:r>
+              <a:rPr/>
+              <a:t>”</a:t>
+            </a:r>
+            <a:r>
+              <a:rPr/>
+              <a:t> </a:t>
+            </a:r>
+            <a:r>
+              <a:rPr/>
+              <a:t>which</a:t>
+            </a:r>
+            <a:r>
+              <a:rPr/>
+              <a:t> </a:t>
+            </a:r>
+            <a:r>
+              <a:rPr/>
+              <a:t>can</a:t>
+            </a:r>
+            <a:r>
+              <a:rPr/>
+              <a:t> </a:t>
+            </a:r>
+            <a:r>
+              <a:rPr/>
+              <a:t>be</a:t>
+            </a:r>
+            <a:r>
+              <a:rPr/>
+              <a:t> </a:t>
+            </a:r>
+            <a:r>
+              <a:rPr/>
+              <a:t>traced</a:t>
+            </a:r>
+            <a:r>
+              <a:rPr/>
+              <a:t> </a:t>
+            </a:r>
+            <a:r>
+              <a:rPr/>
+              <a:t>all</a:t>
+            </a:r>
+            <a:r>
+              <a:rPr/>
+              <a:t> </a:t>
+            </a:r>
+            <a:r>
+              <a:rPr/>
+              <a:t>the</a:t>
+            </a:r>
+            <a:r>
+              <a:rPr/>
+              <a:t> </a:t>
+            </a:r>
+            <a:r>
+              <a:rPr/>
+              <a:t>way</a:t>
+            </a:r>
+            <a:r>
+              <a:rPr/>
+              <a:t> </a:t>
+            </a:r>
+            <a:r>
+              <a:rPr/>
+              <a:t>back</a:t>
+            </a:r>
+            <a:r>
+              <a:rPr/>
+              <a:t> </a:t>
+            </a:r>
+            <a:r>
+              <a:rPr/>
+              <a:t>to</a:t>
+            </a:r>
+            <a:r>
+              <a:rPr/>
+              <a:t> </a:t>
+            </a:r>
+            <a:r>
+              <a:rPr/>
+              <a:t>the</a:t>
+            </a:r>
+            <a:r>
+              <a:rPr/>
+              <a:t> </a:t>
+            </a:r>
+            <a:r>
+              <a:rPr/>
+              <a:t>early</a:t>
+            </a:r>
+            <a:r>
+              <a:rPr/>
+              <a:t> </a:t>
+            </a:r>
+            <a:r>
+              <a:rPr/>
+              <a:t>1300s,</a:t>
+            </a:r>
+            <a:r>
+              <a:rPr/>
+              <a:t> </a:t>
+            </a:r>
+            <a:r>
+              <a:rPr/>
+              <a:t>according</a:t>
+            </a:r>
+            <a:r>
+              <a:rPr/>
+              <a:t> </a:t>
+            </a:r>
+            <a:r>
+              <a:rPr/>
+              <a:t>to</a:t>
+            </a:r>
+            <a:r>
+              <a:rPr/>
+              <a:t> </a:t>
+            </a:r>
+            <a:r>
+              <a:rPr/>
+              <a:t>dictionary.com.</a:t>
+            </a:r>
+          </a:p>
+          <a:p>
+            <a:pPr lvl="0" marL="0" indent="0">
+              <a:buNone/>
+            </a:pPr>
+          </a:p>
+          <a:p>
+            <a:pPr lvl="0" marL="0" indent="0">
+              <a:buNone/>
+            </a:pPr>
+            <a:r>
+              <a:rPr/>
+              <a:t>You</a:t>
+            </a:r>
+            <a:r>
+              <a:rPr/>
+              <a:t> </a:t>
+            </a:r>
+            <a:r>
+              <a:rPr/>
+              <a:t>can</a:t>
+            </a:r>
+            <a:r>
+              <a:rPr/>
+              <a:t> </a:t>
+            </a:r>
+            <a:r>
+              <a:rPr/>
+              <a:t>find</a:t>
+            </a:r>
+            <a:r>
+              <a:rPr/>
+              <a:t> </a:t>
+            </a:r>
+            <a:r>
+              <a:rPr/>
+              <a:t>this</a:t>
+            </a:r>
+            <a:r>
+              <a:rPr/>
+              <a:t> </a:t>
+            </a:r>
+            <a:r>
+              <a:rPr/>
+              <a:t>image</a:t>
+            </a:r>
+            <a:r>
+              <a:rPr/>
+              <a:t> </a:t>
+            </a:r>
+            <a:r>
+              <a:rPr/>
+              <a:t>at</a:t>
+            </a:r>
+            <a:r>
+              <a:rPr/>
+              <a:t> </a:t>
+            </a:r>
+            <a:r>
+              <a:rPr/>
+              <a:t>the</a:t>
+            </a:r>
+            <a:r>
+              <a:rPr/>
+              <a:t> </a:t>
+            </a:r>
+            <a:r>
+              <a:rPr/>
+              <a:t>Lawrence</a:t>
+            </a:r>
+            <a:r>
+              <a:rPr/>
+              <a:t> </a:t>
+            </a:r>
+            <a:r>
+              <a:rPr/>
+              <a:t>Livermore</a:t>
+            </a:r>
+            <a:r>
+              <a:rPr/>
+              <a:t> </a:t>
+            </a:r>
+            <a:r>
+              <a:rPr/>
+              <a:t>Naitonal</a:t>
+            </a:r>
+            <a:r>
+              <a:rPr/>
+              <a:t> </a:t>
+            </a:r>
+            <a:r>
+              <a:rPr/>
+              <a:t>Laboratory</a:t>
+            </a:r>
+            <a:r>
+              <a:rPr/>
+              <a:t> </a:t>
+            </a:r>
+            <a:r>
+              <a:rPr/>
+              <a:t>website,</a:t>
+            </a:r>
+            <a:r>
+              <a:rPr/>
+              <a:t> </a:t>
+            </a:r>
+            <a:r>
+              <a:rPr/>
+              <a:t>in</a:t>
+            </a:r>
+            <a:r>
+              <a:rPr/>
+              <a:t> </a:t>
+            </a:r>
+            <a:r>
+              <a:rPr/>
+              <a:t>a</a:t>
+            </a:r>
+            <a:r>
+              <a:rPr/>
+              <a:t> </a:t>
+            </a:r>
+            <a:r>
+              <a:rPr/>
+              <a:t>tutorial</a:t>
+            </a:r>
+            <a:r>
+              <a:rPr/>
+              <a:t> </a:t>
+            </a:r>
+            <a:r>
+              <a:rPr/>
+              <a:t>article</a:t>
+            </a:r>
+            <a:r>
+              <a:rPr/>
+              <a:t> </a:t>
+            </a:r>
+            <a:r>
+              <a:rPr/>
+              <a:t>on</a:t>
+            </a:r>
+            <a:r>
+              <a:rPr/>
+              <a:t> </a:t>
+            </a:r>
+            <a:r>
+              <a:rPr/>
+              <a:t>parallel</a:t>
+            </a:r>
+            <a:r>
+              <a:rPr/>
+              <a:t> </a:t>
+            </a:r>
+            <a:r>
+              <a:rPr/>
+              <a:t>computing</a:t>
+            </a:r>
+            <a:r>
+              <a:rPr/>
+              <a:t> </a:t>
+            </a:r>
+            <a:r>
+              <a:rPr/>
+              <a:t>written</a:t>
+            </a:r>
+            <a:r>
+              <a:rPr/>
+              <a:t> </a:t>
+            </a:r>
+            <a:r>
+              <a:rPr/>
+              <a:t>by</a:t>
+            </a:r>
+            <a:r>
+              <a:rPr/>
+              <a:t> </a:t>
+            </a:r>
+            <a:r>
+              <a:rPr/>
+              <a:t>Blaise</a:t>
+            </a:r>
+            <a:r>
+              <a:rPr/>
+              <a:t> </a:t>
+            </a:r>
+            <a:r>
+              <a:rPr/>
+              <a:t>Barney</a:t>
+            </a:r>
+            <a:r>
+              <a:rPr/>
+              <a:t> </a:t>
+            </a:r>
+            <a:r>
+              <a:rPr/>
+              <a:t>(</a:t>
+            </a:r>
+            <a:r>
+              <a:rPr/>
+              <a:t>https://computing.llnl.gov/tutorials/parallel_comp/</a:t>
+            </a:r>
+            <a:r>
+              <a:rPr/>
+              <a:t>).</a:t>
+            </a:r>
+            <a:r>
+              <a:rPr/>
+              <a:t> </a:t>
+            </a:r>
+            <a:r>
+              <a:rPr/>
+              <a:t>The</a:t>
+            </a:r>
+            <a:r>
+              <a:rPr/>
+              <a:t> </a:t>
+            </a:r>
+            <a:r>
+              <a:rPr/>
+              <a:t>article</a:t>
+            </a:r>
+            <a:r>
+              <a:rPr/>
+              <a:t> </a:t>
+            </a:r>
+            <a:r>
+              <a:rPr/>
+              <a:t>is</a:t>
+            </a:r>
+            <a:r>
+              <a:rPr/>
+              <a:t> </a:t>
+            </a:r>
+            <a:r>
+              <a:rPr/>
+              <a:t>copyrighted,</a:t>
+            </a:r>
+            <a:r>
+              <a:rPr/>
+              <a:t> </a:t>
+            </a:r>
+            <a:r>
+              <a:rPr/>
+              <a:t>and</a:t>
+            </a:r>
+            <a:r>
+              <a:rPr/>
+              <a:t> </a:t>
+            </a:r>
+            <a:r>
+              <a:rPr/>
+              <a:t>the</a:t>
+            </a:r>
+            <a:r>
+              <a:rPr/>
+              <a:t> </a:t>
+            </a:r>
+            <a:r>
+              <a:rPr/>
+              <a:t>excerpt</a:t>
+            </a:r>
+            <a:r>
+              <a:rPr/>
+              <a:t> </a:t>
+            </a:r>
+            <a:r>
+              <a:rPr/>
+              <a:t>used</a:t>
+            </a:r>
+            <a:r>
+              <a:rPr/>
+              <a:t> </a:t>
+            </a:r>
+            <a:r>
+              <a:rPr/>
+              <a:t>here</a:t>
+            </a:r>
+            <a:r>
+              <a:rPr/>
+              <a:t> </a:t>
+            </a:r>
+            <a:r>
+              <a:rPr/>
+              <a:t>is</a:t>
+            </a:r>
+            <a:r>
+              <a:rPr/>
+              <a:t> </a:t>
+            </a:r>
+            <a:r>
+              <a:rPr/>
+              <a:t>covered</a:t>
+            </a:r>
+            <a:r>
+              <a:rPr/>
+              <a:t> </a:t>
+            </a:r>
+            <a:r>
+              <a:rPr/>
+              <a:t>under</a:t>
+            </a:r>
+            <a:r>
+              <a:rPr/>
+              <a:t> </a:t>
+            </a:r>
+            <a:r>
+              <a:rPr/>
+              <a:t>the</a:t>
+            </a:r>
+            <a:r>
+              <a:rPr/>
+              <a:t> </a:t>
+            </a:r>
+            <a:r>
+              <a:rPr/>
+              <a:t>fair</a:t>
+            </a:r>
+            <a:r>
+              <a:rPr/>
+              <a:t> </a:t>
+            </a:r>
+            <a:r>
+              <a:rPr/>
+              <a:t>use</a:t>
+            </a:r>
+            <a:r>
+              <a:rPr/>
+              <a:t> </a:t>
+            </a:r>
+            <a:r>
+              <a:rPr/>
+              <a:t>provisions</a:t>
+            </a:r>
+            <a:r>
+              <a:rPr/>
+              <a:t> </a:t>
+            </a:r>
+            <a:r>
+              <a:rPr/>
+              <a:t>of</a:t>
+            </a:r>
+            <a:r>
+              <a:rPr/>
+              <a:t> </a:t>
+            </a:r>
+            <a:r>
+              <a:rPr/>
+              <a:t>copyright</a:t>
+            </a:r>
+            <a:r>
+              <a:rPr/>
+              <a:t> </a:t>
+            </a:r>
+            <a:r>
+              <a:rPr/>
+              <a:t>law.</a:t>
+            </a:r>
+          </a:p>
+        </p:txBody>
+      </p:sp>
+      <p:sp>
+        <p:nvSpPr>
+          <p:cNvPr id="4" name="Slide Number Placeholder 3"/>
+          <p:cNvSpPr>
+            <a:spLocks noGrp="1"/>
+          </p:cNvSpPr>
+          <p:nvPr>
+            <p:ph type="sldNum" sz="quarter" idx="10"/>
+          </p:nvPr>
+        </p:nvSpPr>
+        <p:spPr/>
+        <p:txBody>
+          <a:bodyPr/>
+          <a:lstStyle/>
+          <a:p>
+            <a:fld id="{18BDFEC3-8487-43E8-A154-7C12CBC1FFF2}" type="slidenum">
+              <a:rPr lang="en-US"/>
+              <a:t>9</a:t>
+            </a:fld>
+            <a:endParaRPr lang="en-US"/>
+          </a:p>
+        </p:txBody>
+      </p:sp>
+    </p:spTree>
+  </p:cSld>
+</p:notes>
+</file>
+
+<file path=ppt/notesSlides/notesSlide9.xml><?xml version="1.0" encoding="utf-8"?>
+<p:notes xmlns:a="http://schemas.openxmlformats.org/drawingml/2006/main" xmlns:r="http://schemas.openxmlformats.org/officeDocument/2006/relationships" xmlns:p="http://schemas.openxmlformats.org/presentationml/2006/main">
+  <p:cSld>
+    <p:spTree>
+      <p:nvGrpSpPr>
+        <p:cNvPr id="1" name=""/>
+        <p:cNvGrpSpPr/>
+        <p:nvPr/>
+      </p:nvGrpSpPr>
+      <p:grpSpPr>
+        <a:xfrm>
+          <a:off x="0" y="0"/>
+          <a:ext cx="0" cy="0"/>
+          <a:chOff x="0" y="0"/>
+          <a:chExt cx="0" cy="0"/>
+        </a:xfrm>
+      </p:grpSpPr>
+      <p:sp>
+        <p:nvSpPr>
+          <p:cNvPr id="2" name="Slide Image Placeholder 1"/>
+          <p:cNvSpPr>
+            <a:spLocks noGrp="1" noRot="1" noChangeAspect="1"/>
+          </p:cNvSpPr>
+          <p:nvPr>
+            <p:ph type="sldImg"/>
+          </p:nvPr>
+        </p:nvSpPr>
+        <p:spPr/>
+      </p:sp>
+      <p:sp>
+        <p:nvSpPr>
+          <p:cNvPr id="3" name="Notes Placeholder 2"/>
+          <p:cNvSpPr>
+            <a:spLocks noGrp="1"/>
+          </p:cNvSpPr>
+          <p:nvPr>
+            <p:ph type="body" idx="1"/>
+          </p:nvPr>
+        </p:nvSpPr>
+        <p:spPr/>
+        <p:txBody>
+          <a:bodyPr/>
+          <a:lstStyle/>
+          <a:p>
+            <a:pPr lvl="0" marL="0" indent="0">
+              <a:buNone/>
+            </a:pPr>
+            <a:r>
+              <a:rPr/>
+              <a:t>In</a:t>
+            </a:r>
+            <a:r>
+              <a:rPr/>
+              <a:t> </a:t>
+            </a:r>
+            <a:r>
+              <a:rPr/>
+              <a:t>Statistics,</a:t>
+            </a:r>
+            <a:r>
+              <a:rPr/>
+              <a:t> </a:t>
+            </a:r>
+            <a:r>
+              <a:rPr/>
+              <a:t>you</a:t>
+            </a:r>
+            <a:r>
+              <a:rPr/>
+              <a:t> </a:t>
+            </a:r>
+            <a:r>
+              <a:rPr/>
+              <a:t>often</a:t>
+            </a:r>
+            <a:r>
+              <a:rPr/>
+              <a:t> </a:t>
+            </a:r>
+            <a:r>
+              <a:rPr/>
+              <a:t>see</a:t>
+            </a:r>
+            <a:r>
+              <a:rPr/>
+              <a:t> </a:t>
+            </a:r>
+            <a:r>
+              <a:rPr/>
+              <a:t>the</a:t>
+            </a:r>
+            <a:r>
+              <a:rPr/>
+              <a:t> </a:t>
+            </a:r>
+            <a:r>
+              <a:rPr/>
+              <a:t>Greek</a:t>
+            </a:r>
+            <a:r>
+              <a:rPr/>
+              <a:t> </a:t>
+            </a:r>
+            <a:r>
+              <a:rPr/>
+              <a:t>letter</a:t>
+            </a:r>
+            <a:r>
+              <a:rPr/>
+              <a:t> </a:t>
+            </a:r>
+            <a:r>
+              <a:rPr/>
+              <a:t>Sigma</a:t>
+            </a:r>
+            <a:r>
+              <a:rPr/>
+              <a:t> </a:t>
+            </a:r>
+            <a:r>
+              <a:rPr/>
+              <a:t>in</a:t>
+            </a:r>
+            <a:r>
+              <a:rPr/>
+              <a:t> </a:t>
+            </a:r>
+            <a:r>
+              <a:rPr/>
+              <a:t>various</a:t>
+            </a:r>
+            <a:r>
+              <a:rPr/>
+              <a:t> </a:t>
+            </a:r>
+            <a:r>
+              <a:rPr/>
+              <a:t>formulas.</a:t>
+            </a:r>
+            <a:r>
+              <a:rPr/>
+              <a:t> </a:t>
+            </a:r>
+            <a:r>
+              <a:rPr/>
+              <a:t>Anywhere</a:t>
+            </a:r>
+            <a:r>
+              <a:rPr/>
+              <a:t> </a:t>
+            </a:r>
+            <a:r>
+              <a:rPr/>
+              <a:t>you</a:t>
+            </a:r>
+            <a:r>
+              <a:rPr/>
+              <a:t> </a:t>
+            </a:r>
+            <a:r>
+              <a:rPr/>
+              <a:t>see</a:t>
+            </a:r>
+            <a:r>
+              <a:rPr/>
+              <a:t> </a:t>
+            </a:r>
+            <a:r>
+              <a:rPr/>
+              <a:t>a</a:t>
+            </a:r>
+            <a:r>
+              <a:rPr/>
+              <a:t> </a:t>
+            </a:r>
+            <a:r>
+              <a:rPr/>
+              <a:t>Sigma,</a:t>
+            </a:r>
+            <a:r>
+              <a:rPr/>
+              <a:t> </a:t>
+            </a:r>
+            <a:r>
+              <a:rPr/>
+              <a:t>you</a:t>
+            </a:r>
+            <a:r>
+              <a:rPr/>
+              <a:t> </a:t>
+            </a:r>
+            <a:r>
+              <a:rPr/>
+              <a:t>have</a:t>
+            </a:r>
+            <a:r>
+              <a:rPr/>
+              <a:t> </a:t>
+            </a:r>
+            <a:r>
+              <a:rPr/>
+              <a:t>an</a:t>
+            </a:r>
+            <a:r>
+              <a:rPr/>
+              <a:t> </a:t>
+            </a:r>
+            <a:r>
+              <a:rPr/>
+              <a:t>opportunity</a:t>
+            </a:r>
+            <a:r>
+              <a:rPr/>
+              <a:t> </a:t>
+            </a:r>
+            <a:r>
+              <a:rPr/>
+              <a:t>to</a:t>
+            </a:r>
+            <a:r>
+              <a:rPr/>
+              <a:t> </a:t>
+            </a:r>
+            <a:r>
+              <a:rPr/>
+              <a:t>take</a:t>
+            </a:r>
+            <a:r>
+              <a:rPr/>
+              <a:t> </a:t>
+            </a:r>
+            <a:r>
+              <a:rPr/>
+              <a:t>advantage</a:t>
+            </a:r>
+            <a:r>
+              <a:rPr/>
+              <a:t> </a:t>
+            </a:r>
+            <a:r>
+              <a:rPr/>
+              <a:t>of</a:t>
+            </a:r>
+            <a:r>
+              <a:rPr/>
+              <a:t> </a:t>
+            </a:r>
+            <a:r>
+              <a:rPr/>
+              <a:t>parallel</a:t>
+            </a:r>
+            <a:r>
+              <a:rPr/>
+              <a:t> </a:t>
+            </a:r>
+            <a:r>
+              <a:rPr/>
+              <a:t>computing.</a:t>
+            </a:r>
+            <a:r>
+              <a:rPr/>
+              <a:t> </a:t>
+            </a:r>
+            <a:r>
+              <a:rPr/>
+              <a:t>Note</a:t>
+            </a:r>
+            <a:r>
+              <a:rPr/>
+              <a:t> </a:t>
+            </a:r>
+            <a:r>
+              <a:rPr/>
+              <a:t>that</a:t>
+            </a:r>
+            <a:r>
+              <a:rPr/>
+              <a:t> </a:t>
+            </a:r>
+            <a:r>
+              <a:rPr/>
+              <a:t>counting</a:t>
+            </a:r>
+            <a:r>
+              <a:rPr/>
+              <a:t> </a:t>
+            </a:r>
+            <a:r>
+              <a:rPr/>
+              <a:t>fits</a:t>
+            </a:r>
+            <a:r>
+              <a:rPr/>
+              <a:t> </a:t>
+            </a:r>
+            <a:r>
+              <a:rPr/>
+              <a:t>into</a:t>
+            </a:r>
+            <a:r>
+              <a:rPr/>
+              <a:t> </a:t>
+            </a:r>
+            <a:r>
+              <a:rPr/>
+              <a:t>this</a:t>
+            </a:r>
+            <a:r>
+              <a:rPr/>
+              <a:t> </a:t>
+            </a:r>
+            <a:r>
+              <a:rPr/>
+              <a:t>framework</a:t>
+            </a:r>
+            <a:r>
+              <a:rPr/>
+              <a:t> </a:t>
+            </a:r>
+            <a:r>
+              <a:rPr/>
+              <a:t>nicely.</a:t>
+            </a:r>
+            <a:r>
+              <a:rPr/>
+              <a:t> </a:t>
+            </a:r>
+            <a:r>
+              <a:rPr/>
+              <a:t>It</a:t>
+            </a:r>
+            <a:r>
+              <a:rPr/>
+              <a:t> </a:t>
+            </a:r>
+            <a:r>
+              <a:rPr/>
+              <a:t>is</a:t>
+            </a:r>
+            <a:r>
+              <a:rPr/>
+              <a:t> </a:t>
+            </a:r>
+            <a:r>
+              <a:rPr/>
+              <a:t>simply</a:t>
+            </a:r>
+            <a:r>
+              <a:rPr/>
+              <a:t> </a:t>
+            </a:r>
+            <a:r>
+              <a:rPr/>
+              <a:t>the</a:t>
+            </a:r>
+            <a:r>
+              <a:rPr/>
+              <a:t> </a:t>
+            </a:r>
+            <a:r>
+              <a:rPr/>
+              <a:t>sum</a:t>
+            </a:r>
+            <a:r>
+              <a:rPr/>
+              <a:t> </a:t>
+            </a:r>
+            <a:r>
+              <a:rPr/>
+              <a:t>of</a:t>
+            </a:r>
+            <a:r>
+              <a:rPr/>
+              <a:t> </a:t>
+            </a:r>
+            <a:r>
+              <a:rPr/>
+              <a:t>X’s</a:t>
+            </a:r>
+            <a:r>
+              <a:rPr/>
+              <a:t> </a:t>
+            </a:r>
+            <a:r>
+              <a:rPr/>
+              <a:t>where</a:t>
+            </a:r>
+            <a:r>
+              <a:rPr/>
+              <a:t> </a:t>
+            </a:r>
+            <a:r>
+              <a:rPr/>
+              <a:t>the</a:t>
+            </a:r>
+            <a:r>
+              <a:rPr/>
+              <a:t> </a:t>
+            </a:r>
+            <a:r>
+              <a:rPr/>
+              <a:t>X’s</a:t>
+            </a:r>
+            <a:r>
+              <a:rPr/>
+              <a:t> </a:t>
+            </a:r>
+            <a:r>
+              <a:rPr/>
+              <a:t>are</a:t>
+            </a:r>
+            <a:r>
+              <a:rPr/>
+              <a:t> </a:t>
+            </a:r>
+            <a:r>
+              <a:rPr/>
+              <a:t>either</a:t>
+            </a:r>
+            <a:r>
+              <a:rPr/>
+              <a:t> </a:t>
+            </a:r>
+            <a:r>
+              <a:rPr/>
+              <a:t>0</a:t>
+            </a:r>
+            <a:r>
+              <a:rPr/>
+              <a:t> </a:t>
+            </a:r>
+            <a:r>
+              <a:rPr/>
+              <a:t>or</a:t>
+            </a:r>
+            <a:r>
+              <a:rPr/>
+              <a:t> </a:t>
+            </a:r>
+            <a:r>
+              <a:rPr/>
+              <a:t>1.</a:t>
+            </a:r>
+          </a:p>
+        </p:txBody>
+      </p:sp>
+      <p:sp>
+        <p:nvSpPr>
+          <p:cNvPr id="4" name="Slide Number Placeholder 3"/>
+          <p:cNvSpPr>
+            <a:spLocks noGrp="1"/>
+          </p:cNvSpPr>
+          <p:nvPr>
+            <p:ph type="sldNum" sz="quarter" idx="10"/>
+          </p:nvPr>
+        </p:nvSpPr>
+        <p:spPr/>
+        <p:txBody>
+          <a:bodyPr/>
+          <a:lstStyle/>
+          <a:p>
+            <a:fld id="{18BDFEC3-8487-43E8-A154-7C12CBC1FFF2}" type="slidenum">
+              <a:rPr lang="en-US"/>
+              <a:t>10</a:t>
+            </a:fld>
+            <a:endParaRPr lang="en-US"/>
+          </a:p>
+        </p:txBody>
+      </p:sp>
+    </p:spTree>
+  </p:cSld>
+</p:notes>
 </file>
 
 <file path=ppt/slideLayouts/slideLayout1.xml><?xml version="1.0" encoding="utf-8"?>
@@ -10986,6 +12583,272 @@
           </a:p>
         </p:txBody>
       </p:sp>
+    </p:spTree>
+  </p:cSld>
+</p:sld>
+</file>
+
+<file path=ppt/slides/slide10.xml><?xml version="1.0" encoding="utf-8"?>
+<p:sld xmlns:a="http://schemas.openxmlformats.org/drawingml/2006/main" xmlns:r="http://schemas.openxmlformats.org/officeDocument/2006/relationships" xmlns:p="http://schemas.openxmlformats.org/presentationml/2006/main">
+  <p:cSld>
+    <p:spTree>
+      <p:nvGrpSpPr>
+        <p:cNvPr id="1" name=""/>
+        <p:cNvGrpSpPr/>
+        <p:nvPr/>
+      </p:nvGrpSpPr>
+      <p:grpSpPr>
+        <a:xfrm>
+          <a:off x="0" y="0"/>
+          <a:ext cx="0" cy="0"/>
+          <a:chOff x="0" y="0"/>
+          <a:chExt cx="0" cy="0"/>
+        </a:xfrm>
+      </p:grpSpPr>
+      <p:sp>
+        <p:nvSpPr>
+          <p:cNvPr id="2" name="Title 1"/>
+          <p:cNvSpPr>
+            <a:spLocks noGrp="1"/>
+          </p:cNvSpPr>
+          <p:nvPr>
+            <p:ph type="title"/>
+          </p:nvPr>
+        </p:nvSpPr>
+        <p:spPr/>
+        <p:txBody>
+          <a:bodyPr/>
+          <a:lstStyle/>
+          <a:p>
+            <a:pPr lvl="0" marL="0" indent="0">
+              <a:buNone/>
+            </a:pPr>
+            <a:r>
+              <a:rPr/>
+              <a:t>Where</a:t>
+            </a:r>
+            <a:r>
+              <a:rPr/>
+              <a:t> </a:t>
+            </a:r>
+            <a:r>
+              <a:rPr/>
+              <a:t>parallel</a:t>
+            </a:r>
+            <a:r>
+              <a:rPr/>
+              <a:t> </a:t>
+            </a:r>
+            <a:r>
+              <a:rPr/>
+              <a:t>computing</a:t>
+            </a:r>
+            <a:r>
+              <a:rPr/>
+              <a:t> </a:t>
+            </a:r>
+            <a:r>
+              <a:rPr/>
+              <a:t>helps</a:t>
+            </a:r>
+          </a:p>
+        </p:txBody>
+      </p:sp>
+      <mc:AlternateContent xmlns:mc="http://schemas.openxmlformats.org/markup-compatibility/2006">
+        <mc:Choice xmlns:a14="http://schemas.microsoft.com/office/drawing/2010/main" Requires="a14">
+          <p:sp>
+            <p:nvSpPr>
+              <p:cNvPr id="3" name="Content Placeholder 2"/>
+              <p:cNvSpPr>
+                <a:spLocks noGrp="1"/>
+              </p:cNvSpPr>
+              <p:nvPr>
+                <p:ph idx="1"/>
+              </p:nvPr>
+            </p:nvSpPr>
+            <p:spPr/>
+            <p:txBody>
+              <a:bodyPr/>
+              <a:lstStyle/>
+              <a:p>
+                <a:pPr lvl="0" marL="0" indent="0">
+                  <a:buNone/>
+                </a:pPr>
+                <a:r>
+                  <a:rPr/>
+                  <a:t>Some of the most fundamental statistcal summaries in statistics are easily split into small pieces.</a:t>
+                </a:r>
+              </a:p>
+              <a:p>
+                <a:pPr lvl="0" marL="0" indent="0">
+                  <a:buNone/>
+                </a:pPr>
+                <a14:m>
+                  <m:oMath xmlns:m="http://schemas.openxmlformats.org/officeDocument/2006/math">
+                    <m:bar>
+                      <m:barPr>
+                        <m:pos m:val="top"/>
+                      </m:barPr>
+                      <m:e>
+                        <m:r>
+                          <m:t>X</m:t>
+                        </m:r>
+                      </m:e>
+                    </m:bar>
+                    <m:r>
+                      <m:t>=</m:t>
+                    </m:r>
+                    <m:f>
+                      <m:fPr>
+                        <m:type m:val="bar"/>
+                      </m:fPr>
+                      <m:num>
+                        <m:r>
+                          <m:t>1</m:t>
+                        </m:r>
+                      </m:num>
+                      <m:den>
+                        <m:r>
+                          <m:t>n</m:t>
+                        </m:r>
+                      </m:den>
+                    </m:f>
+                    <m:r>
+                      <m:t>Σ</m:t>
+                    </m:r>
+                    <m:sSub>
+                      <m:e>
+                        <m:r>
+                          <m:t>X</m:t>
+                        </m:r>
+                      </m:e>
+                      <m:sub>
+                        <m:r>
+                          <m:t>i</m:t>
+                        </m:r>
+                      </m:sub>
+                    </m:sSub>
+                    <m:r>
+                      <m:t>=</m:t>
+                    </m:r>
+                    <m:f>
+                      <m:fPr>
+                        <m:type m:val="bar"/>
+                      </m:fPr>
+                      <m:num>
+                        <m:r>
+                          <m:t>1</m:t>
+                        </m:r>
+                      </m:num>
+                      <m:den>
+                        <m:r>
+                          <m:t>n</m:t>
+                        </m:r>
+                      </m:den>
+                    </m:f>
+                    <m:r>
+                      <m:t>(</m:t>
+                    </m:r>
+                    <m:sSub>
+                      <m:e>
+                        <m:r>
+                          <m:t>Σ</m:t>
+                        </m:r>
+                      </m:e>
+                      <m:sub>
+                        <m:r>
+                          <m:t>1</m:t>
+                        </m:r>
+                      </m:sub>
+                    </m:sSub>
+                    <m:sSub>
+                      <m:e>
+                        <m:r>
+                          <m:t>X</m:t>
+                        </m:r>
+                      </m:e>
+                      <m:sub>
+                        <m:r>
+                          <m:t>i</m:t>
+                        </m:r>
+                      </m:sub>
+                    </m:sSub>
+                    <m:r>
+                      <m:t>+</m:t>
+                    </m:r>
+                    <m:sSub>
+                      <m:e>
+                        <m:r>
+                          <m:t>Σ</m:t>
+                        </m:r>
+                      </m:e>
+                      <m:sub>
+                        <m:r>
+                          <m:t>2</m:t>
+                        </m:r>
+                      </m:sub>
+                    </m:sSub>
+                    <m:sSub>
+                      <m:e>
+                        <m:r>
+                          <m:t>X</m:t>
+                        </m:r>
+                      </m:e>
+                      <m:sub>
+                        <m:r>
+                          <m:t>i</m:t>
+                        </m:r>
+                      </m:sub>
+                    </m:sSub>
+                    <m:r>
+                      <m:t>+</m:t>
+                    </m:r>
+                    <m:r>
+                      <m:t>.</m:t>
+                    </m:r>
+                    <m:r>
+                      <m:t>.</m:t>
+                    </m:r>
+                    <m:r>
+                      <m:t>.</m:t>
+                    </m:r>
+                    <m:r>
+                      <m:t>+</m:t>
+                    </m:r>
+                    <m:sSub>
+                      <m:e>
+                        <m:r>
+                          <m:t>Σ</m:t>
+                        </m:r>
+                      </m:e>
+                      <m:sub>
+                        <m:r>
+                          <m:t>k</m:t>
+                        </m:r>
+                      </m:sub>
+                    </m:sSub>
+                    <m:sSub>
+                      <m:e>
+                        <m:r>
+                          <m:t>X</m:t>
+                        </m:r>
+                      </m:e>
+                      <m:sub>
+                        <m:r>
+                          <m:t>i</m:t>
+                        </m:r>
+                      </m:sub>
+                    </m:sSub>
+                    <m:r>
+                      <m:t>)</m:t>
+                    </m:r>
+                  </m:oMath>
+                </a14:m>
+              </a:p>
+            </p:txBody>
+          </p:sp>
+        </mc:Choice>
+      </mc:AlternateContent>
     </p:spTree>
   </p:cSld>
 </p:sld>

</xml_diff>

<commit_message>
Finalized introduction.Rmd, started work on software.Rmd.
</commit_message>
<xml_diff>
--- a/talks/introduction.pptx
+++ b/talks/introduction.pptx
@@ -5,7 +5,7 @@
     <p:sldMasterId id="2147483648" r:id="rId1"/>
   </p:sldMasterIdLst>
   <p:notesMasterIdLst>
-    <p:NotesMasterId r:id="rId12"/>
+    <p:NotesMasterId r:id="rId13"/>
   </p:notesMasterIdLst>
   <p:sldIdLst>
     <p:sldId id="256" r:id="rId2"/>
@@ -18,6 +18,7 @@
     <p:sldId id="263" r:id="rId9"/>
     <p:sldId id="264" r:id="rId10"/>
     <p:sldId id="265" r:id="rId11"/>
+    <p:sldId id="266" r:id="rId12"/>
   </p:sldIdLst>
   <p:sldSz cx="9144000" cy="6858000" type="screen4x3"/>
   <p:notesSz cx="6858000" cy="9144000"/>
@@ -2295,6 +2296,590 @@
             <a:fld id="{18BDFEC3-8487-43E8-A154-7C12CBC1FFF2}" type="slidenum">
               <a:rPr lang="en-US"/>
               <a:t>2</a:t>
+            </a:fld>
+            <a:endParaRPr lang="en-US"/>
+          </a:p>
+        </p:txBody>
+      </p:sp>
+    </p:spTree>
+  </p:cSld>
+</p:notes>
+</file>
+
+<file path=ppt/notesSlides/notesSlide10.xml><?xml version="1.0" encoding="utf-8"?>
+<p:notes xmlns:a="http://schemas.openxmlformats.org/drawingml/2006/main" xmlns:r="http://schemas.openxmlformats.org/officeDocument/2006/relationships" xmlns:p="http://schemas.openxmlformats.org/presentationml/2006/main">
+  <p:cSld>
+    <p:spTree>
+      <p:nvGrpSpPr>
+        <p:cNvPr id="1" name=""/>
+        <p:cNvGrpSpPr/>
+        <p:nvPr/>
+      </p:nvGrpSpPr>
+      <p:grpSpPr>
+        <a:xfrm>
+          <a:off x="0" y="0"/>
+          <a:ext cx="0" cy="0"/>
+          <a:chOff x="0" y="0"/>
+          <a:chExt cx="0" cy="0"/>
+        </a:xfrm>
+      </p:grpSpPr>
+      <p:sp>
+        <p:nvSpPr>
+          <p:cNvPr id="2" name="Slide Image Placeholder 1"/>
+          <p:cNvSpPr>
+            <a:spLocks noGrp="1" noRot="1" noChangeAspect="1"/>
+          </p:cNvSpPr>
+          <p:nvPr>
+            <p:ph type="sldImg"/>
+          </p:nvPr>
+        </p:nvSpPr>
+        <p:spPr/>
+      </p:sp>
+      <p:sp>
+        <p:nvSpPr>
+          <p:cNvPr id="3" name="Notes Placeholder 2"/>
+          <p:cNvSpPr>
+            <a:spLocks noGrp="1"/>
+          </p:cNvSpPr>
+          <p:nvPr>
+            <p:ph type="body" idx="1"/>
+          </p:nvPr>
+        </p:nvSpPr>
+        <p:spPr/>
+        <p:txBody>
+          <a:bodyPr/>
+          <a:lstStyle/>
+          <a:p>
+            <a:pPr lvl="0" marL="0" indent="0">
+              <a:buNone/>
+            </a:pPr>
+            <a:r>
+              <a:rPr/>
+              <a:t>Simulation</a:t>
+            </a:r>
+            <a:r>
+              <a:rPr/>
+              <a:t> </a:t>
+            </a:r>
+            <a:r>
+              <a:rPr/>
+              <a:t>is</a:t>
+            </a:r>
+            <a:r>
+              <a:rPr/>
+              <a:t> </a:t>
+            </a:r>
+            <a:r>
+              <a:rPr/>
+              <a:t>another</a:t>
+            </a:r>
+            <a:r>
+              <a:rPr/>
+              <a:t> </a:t>
+            </a:r>
+            <a:r>
+              <a:rPr/>
+              <a:t>big</a:t>
+            </a:r>
+            <a:r>
+              <a:rPr/>
+              <a:t> </a:t>
+            </a:r>
+            <a:r>
+              <a:rPr/>
+              <a:t>area</a:t>
+            </a:r>
+            <a:r>
+              <a:rPr/>
+              <a:t> </a:t>
+            </a:r>
+            <a:r>
+              <a:rPr/>
+              <a:t>where</a:t>
+            </a:r>
+            <a:r>
+              <a:rPr/>
+              <a:t> </a:t>
+            </a:r>
+            <a:r>
+              <a:rPr/>
+              <a:t>parallel</a:t>
+            </a:r>
+            <a:r>
+              <a:rPr/>
+              <a:t> </a:t>
+            </a:r>
+            <a:r>
+              <a:rPr/>
+              <a:t>computing</a:t>
+            </a:r>
+            <a:r>
+              <a:rPr/>
+              <a:t> </a:t>
+            </a:r>
+            <a:r>
+              <a:rPr/>
+              <a:t>can</a:t>
+            </a:r>
+            <a:r>
+              <a:rPr/>
+              <a:t> </a:t>
+            </a:r>
+            <a:r>
+              <a:rPr/>
+              <a:t>help.</a:t>
+            </a:r>
+            <a:r>
+              <a:rPr/>
+              <a:t> </a:t>
+            </a:r>
+            <a:r>
+              <a:rPr/>
+              <a:t>This</a:t>
+            </a:r>
+            <a:r>
+              <a:rPr/>
+              <a:t> </a:t>
+            </a:r>
+            <a:r>
+              <a:rPr/>
+              <a:t>image</a:t>
+            </a:r>
+            <a:r>
+              <a:rPr/>
+              <a:t> </a:t>
+            </a:r>
+            <a:r>
+              <a:rPr/>
+              <a:t>shows</a:t>
+            </a:r>
+            <a:r>
+              <a:rPr/>
+              <a:t> </a:t>
+            </a:r>
+            <a:r>
+              <a:rPr/>
+              <a:t>an</a:t>
+            </a:r>
+            <a:r>
+              <a:rPr/>
+              <a:t> </a:t>
+            </a:r>
+            <a:r>
+              <a:rPr/>
+              <a:t>illustration</a:t>
+            </a:r>
+            <a:r>
+              <a:rPr/>
+              <a:t> </a:t>
+            </a:r>
+            <a:r>
+              <a:rPr/>
+              <a:t>Hamiltonian</a:t>
+            </a:r>
+            <a:r>
+              <a:rPr/>
+              <a:t> </a:t>
+            </a:r>
+            <a:r>
+              <a:rPr/>
+              <a:t>Monte</a:t>
+            </a:r>
+            <a:r>
+              <a:rPr/>
+              <a:t> </a:t>
+            </a:r>
+            <a:r>
+              <a:rPr/>
+              <a:t>Carlo,</a:t>
+            </a:r>
+            <a:r>
+              <a:rPr/>
+              <a:t> </a:t>
+            </a:r>
+            <a:r>
+              <a:rPr/>
+              <a:t>a</a:t>
+            </a:r>
+            <a:r>
+              <a:rPr/>
+              <a:t> </a:t>
+            </a:r>
+            <a:r>
+              <a:rPr/>
+              <a:t>simulation</a:t>
+            </a:r>
+            <a:r>
+              <a:rPr/>
+              <a:t> </a:t>
+            </a:r>
+            <a:r>
+              <a:rPr/>
+              <a:t>technique</a:t>
+            </a:r>
+            <a:r>
+              <a:rPr/>
+              <a:t> </a:t>
+            </a:r>
+            <a:r>
+              <a:rPr/>
+              <a:t>quite</a:t>
+            </a:r>
+            <a:r>
+              <a:rPr/>
+              <a:t> </a:t>
+            </a:r>
+            <a:r>
+              <a:rPr/>
+              <a:t>useful</a:t>
+            </a:r>
+            <a:r>
+              <a:rPr/>
+              <a:t> </a:t>
+            </a:r>
+            <a:r>
+              <a:rPr/>
+              <a:t>for</a:t>
+            </a:r>
+            <a:r>
+              <a:rPr/>
+              <a:t> </a:t>
+            </a:r>
+            <a:r>
+              <a:rPr/>
+              <a:t>Bayesian</a:t>
+            </a:r>
+            <a:r>
+              <a:rPr/>
+              <a:t> </a:t>
+            </a:r>
+            <a:r>
+              <a:rPr/>
+              <a:t>models.</a:t>
+            </a:r>
+          </a:p>
+          <a:p>
+            <a:pPr lvl="0" marL="0" indent="0">
+              <a:buNone/>
+            </a:pPr>
+          </a:p>
+          <a:p>
+            <a:pPr lvl="0" marL="0" indent="0">
+              <a:buNone/>
+            </a:pPr>
+            <a:r>
+              <a:rPr/>
+              <a:t>This</a:t>
+            </a:r>
+            <a:r>
+              <a:rPr/>
+              <a:t> </a:t>
+            </a:r>
+            <a:r>
+              <a:rPr/>
+              <a:t>image</a:t>
+            </a:r>
+            <a:r>
+              <a:rPr/>
+              <a:t> </a:t>
+            </a:r>
+            <a:r>
+              <a:rPr/>
+              <a:t>is</a:t>
+            </a:r>
+            <a:r>
+              <a:rPr/>
+              <a:t> </a:t>
+            </a:r>
+            <a:r>
+              <a:rPr/>
+              <a:t>a</a:t>
+            </a:r>
+            <a:r>
+              <a:rPr/>
+              <a:t> </a:t>
+            </a:r>
+            <a:r>
+              <a:rPr/>
+              <a:t>screenshot</a:t>
+            </a:r>
+            <a:r>
+              <a:rPr/>
+              <a:t> </a:t>
+            </a:r>
+            <a:r>
+              <a:rPr/>
+              <a:t>of</a:t>
+            </a:r>
+            <a:r>
+              <a:rPr/>
+              <a:t> </a:t>
+            </a:r>
+            <a:r>
+              <a:rPr/>
+              <a:t>a</a:t>
+            </a:r>
+            <a:r>
+              <a:rPr/>
+              <a:t> </a:t>
+            </a:r>
+            <a:r>
+              <a:rPr/>
+              <a:t>web</a:t>
+            </a:r>
+            <a:r>
+              <a:rPr/>
+              <a:t> </a:t>
+            </a:r>
+            <a:r>
+              <a:rPr/>
+              <a:t>page</a:t>
+            </a:r>
+            <a:r>
+              <a:rPr/>
+              <a:t> </a:t>
+            </a:r>
+            <a:r>
+              <a:rPr/>
+              <a:t>on</a:t>
+            </a:r>
+            <a:r>
+              <a:rPr/>
+              <a:t> </a:t>
+            </a:r>
+            <a:r>
+              <a:rPr/>
+              <a:t>Alex</a:t>
+            </a:r>
+            <a:r>
+              <a:rPr/>
+              <a:t> </a:t>
+            </a:r>
+            <a:r>
+              <a:rPr/>
+              <a:t>Roghozhnikov’s</a:t>
+            </a:r>
+            <a:r>
+              <a:rPr/>
+              <a:t> </a:t>
+            </a:r>
+            <a:r>
+              <a:rPr/>
+              <a:t>Brilliantly</a:t>
+            </a:r>
+            <a:r>
+              <a:rPr/>
+              <a:t> </a:t>
+            </a:r>
+            <a:r>
+              <a:rPr/>
+              <a:t>Wrong</a:t>
+            </a:r>
+            <a:r>
+              <a:rPr/>
+              <a:t> </a:t>
+            </a:r>
+            <a:r>
+              <a:rPr/>
+              <a:t>blog</a:t>
+            </a:r>
+            <a:r>
+              <a:rPr/>
+              <a:t> </a:t>
+            </a:r>
+            <a:r>
+              <a:rPr/>
+              <a:t>(</a:t>
+            </a:r>
+            <a:r>
+              <a:rPr/>
+              <a:t>http://arogozhnikov.github.io/2016/12/19/markov_chain_monte_carlo.html</a:t>
+            </a:r>
+            <a:r>
+              <a:rPr/>
+              <a:t>).</a:t>
+            </a:r>
+            <a:r>
+              <a:rPr/>
+              <a:t> </a:t>
+            </a:r>
+            <a:r>
+              <a:rPr/>
+              <a:t>The</a:t>
+            </a:r>
+            <a:r>
+              <a:rPr/>
+              <a:t> </a:t>
+            </a:r>
+            <a:r>
+              <a:rPr/>
+              <a:t>web</a:t>
+            </a:r>
+            <a:r>
+              <a:rPr/>
+              <a:t> </a:t>
+            </a:r>
+            <a:r>
+              <a:rPr/>
+              <a:t>page</a:t>
+            </a:r>
+            <a:r>
+              <a:rPr/>
+              <a:t> </a:t>
+            </a:r>
+            <a:r>
+              <a:rPr/>
+              <a:t>is</a:t>
+            </a:r>
+            <a:r>
+              <a:rPr/>
+              <a:t> </a:t>
+            </a:r>
+            <a:r>
+              <a:rPr/>
+              <a:t>copyrighted,</a:t>
+            </a:r>
+            <a:r>
+              <a:rPr/>
+              <a:t> </a:t>
+            </a:r>
+            <a:r>
+              <a:rPr/>
+              <a:t>and</a:t>
+            </a:r>
+            <a:r>
+              <a:rPr/>
+              <a:t> </a:t>
+            </a:r>
+            <a:r>
+              <a:rPr/>
+              <a:t>the</a:t>
+            </a:r>
+            <a:r>
+              <a:rPr/>
+              <a:t> </a:t>
+            </a:r>
+            <a:r>
+              <a:rPr/>
+              <a:t>excerpt</a:t>
+            </a:r>
+            <a:r>
+              <a:rPr/>
+              <a:t> </a:t>
+            </a:r>
+            <a:r>
+              <a:rPr/>
+              <a:t>used</a:t>
+            </a:r>
+            <a:r>
+              <a:rPr/>
+              <a:t> </a:t>
+            </a:r>
+            <a:r>
+              <a:rPr/>
+              <a:t>here</a:t>
+            </a:r>
+            <a:r>
+              <a:rPr/>
+              <a:t> </a:t>
+            </a:r>
+            <a:r>
+              <a:rPr/>
+              <a:t>is</a:t>
+            </a:r>
+            <a:r>
+              <a:rPr/>
+              <a:t> </a:t>
+            </a:r>
+            <a:r>
+              <a:rPr/>
+              <a:t>covered</a:t>
+            </a:r>
+            <a:r>
+              <a:rPr/>
+              <a:t> </a:t>
+            </a:r>
+            <a:r>
+              <a:rPr/>
+              <a:t>under</a:t>
+            </a:r>
+            <a:r>
+              <a:rPr/>
+              <a:t> </a:t>
+            </a:r>
+            <a:r>
+              <a:rPr/>
+              <a:t>the</a:t>
+            </a:r>
+            <a:r>
+              <a:rPr/>
+              <a:t> </a:t>
+            </a:r>
+            <a:r>
+              <a:rPr/>
+              <a:t>fair</a:t>
+            </a:r>
+            <a:r>
+              <a:rPr/>
+              <a:t> </a:t>
+            </a:r>
+            <a:r>
+              <a:rPr/>
+              <a:t>use</a:t>
+            </a:r>
+            <a:r>
+              <a:rPr/>
+              <a:t> </a:t>
+            </a:r>
+            <a:r>
+              <a:rPr/>
+              <a:t>provisions</a:t>
+            </a:r>
+            <a:r>
+              <a:rPr/>
+              <a:t> </a:t>
+            </a:r>
+            <a:r>
+              <a:rPr/>
+              <a:t>of</a:t>
+            </a:r>
+            <a:r>
+              <a:rPr/>
+              <a:t> </a:t>
+            </a:r>
+            <a:r>
+              <a:rPr/>
+              <a:t>copyright</a:t>
+            </a:r>
+            <a:r>
+              <a:rPr/>
+              <a:t> </a:t>
+            </a:r>
+            <a:r>
+              <a:rPr/>
+              <a:t>law.</a:t>
+            </a:r>
+          </a:p>
+        </p:txBody>
+      </p:sp>
+      <p:sp>
+        <p:nvSpPr>
+          <p:cNvPr id="4" name="Slide Number Placeholder 3"/>
+          <p:cNvSpPr>
+            <a:spLocks noGrp="1"/>
+          </p:cNvSpPr>
+          <p:nvPr>
+            <p:ph type="sldNum" sz="quarter" idx="10"/>
+          </p:nvPr>
+        </p:nvSpPr>
+        <p:spPr/>
+        <p:txBody>
+          <a:bodyPr/>
+          <a:lstStyle/>
+          <a:p>
+            <a:fld id="{18BDFEC3-8487-43E8-A154-7C12CBC1FFF2}" type="slidenum">
+              <a:rPr lang="en-US"/>
+              <a:t>11</a:t>
             </a:fld>
             <a:endParaRPr lang="en-US"/>
           </a:p>
@@ -12625,15 +13210,7 @@
             </a:pPr>
             <a:r>
               <a:rPr/>
-              <a:t>Where</a:t>
-            </a:r>
-            <a:r>
-              <a:rPr/>
-              <a:t> </a:t>
-            </a:r>
-            <a:r>
-              <a:rPr/>
-              <a:t>parallel</a:t>
+              <a:t>Parallel</a:t>
             </a:r>
             <a:r>
               <a:rPr/>
@@ -12649,7 +13226,15 @@
             </a:r>
             <a:r>
               <a:rPr/>
-              <a:t>helps</a:t>
+              <a:t>and</a:t>
+            </a:r>
+            <a:r>
+              <a:rPr/>
+              <a:t> </a:t>
+            </a:r>
+            <a:r>
+              <a:rPr/>
+              <a:t>statistics</a:t>
             </a:r>
           </a:p>
         </p:txBody>
@@ -12676,7 +13261,7 @@
                 </a:pPr>
                 <a:r>
                   <a:rPr/>
-                  <a:t>Some of the most fundamental statistcal summaries in statistics are easily split into small pieces.</a:t>
+                  <a:t>Some of the most fundamental statistical summaries in statistics are easily split into small pieces.</a:t>
                 </a:r>
               </a:p>
               <a:p>
@@ -12854,6 +13439,179 @@
 </p:sld>
 </file>
 
+<file path=ppt/slides/slide11.xml><?xml version="1.0" encoding="utf-8"?>
+<p:sld xmlns:a="http://schemas.openxmlformats.org/drawingml/2006/main" xmlns:r="http://schemas.openxmlformats.org/officeDocument/2006/relationships" xmlns:p="http://schemas.openxmlformats.org/presentationml/2006/main">
+  <p:cSld>
+    <p:spTree>
+      <p:nvGrpSpPr>
+        <p:cNvPr id="1" name=""/>
+        <p:cNvGrpSpPr/>
+        <p:nvPr/>
+      </p:nvGrpSpPr>
+      <p:grpSpPr>
+        <a:xfrm>
+          <a:off x="0" y="0"/>
+          <a:ext cx="0" cy="0"/>
+          <a:chOff x="0" y="0"/>
+          <a:chExt cx="0" cy="0"/>
+        </a:xfrm>
+      </p:grpSpPr>
+      <p:sp>
+        <p:nvSpPr>
+          <p:cNvPr id="2" name="Title 1"/>
+          <p:cNvSpPr>
+            <a:spLocks noGrp="1"/>
+          </p:cNvSpPr>
+          <p:nvPr>
+            <p:ph type="title"/>
+          </p:nvPr>
+        </p:nvSpPr>
+        <p:spPr/>
+        <p:txBody>
+          <a:bodyPr/>
+          <a:lstStyle/>
+          <a:p>
+            <a:pPr lvl="0" marL="0" indent="0">
+              <a:buNone/>
+            </a:pPr>
+            <a:r>
+              <a:rPr/>
+              <a:t>Parallel</a:t>
+            </a:r>
+            <a:r>
+              <a:rPr/>
+              <a:t> </a:t>
+            </a:r>
+            <a:r>
+              <a:rPr/>
+              <a:t>computing</a:t>
+            </a:r>
+            <a:r>
+              <a:rPr/>
+              <a:t> </a:t>
+            </a:r>
+            <a:r>
+              <a:rPr/>
+              <a:t>and</a:t>
+            </a:r>
+            <a:r>
+              <a:rPr/>
+              <a:t> </a:t>
+            </a:r>
+            <a:r>
+              <a:rPr/>
+              <a:t>simulation</a:t>
+            </a:r>
+          </a:p>
+        </p:txBody>
+      </p:sp>
+      <p:pic>
+        <p:nvPicPr>
+          <p:cNvPr descr="../images/stan_simulation.png" id="0" name="Picture 1"/>
+          <p:cNvPicPr>
+            <a:picLocks noGrp="1" noChangeAspect="1"/>
+          </p:cNvPicPr>
+          <p:nvPr/>
+        </p:nvPicPr>
+        <p:blipFill>
+          <a:blip r:embed="rId3"/>
+          <a:stretch>
+            <a:fillRect/>
+          </a:stretch>
+        </p:blipFill>
+        <p:spPr bwMode="auto">
+          <a:xfrm>
+            <a:off x="1993900" y="1600200"/>
+            <a:ext cx="5156200" cy="4013200"/>
+          </a:xfrm>
+          <a:prstGeom prst="rect">
+            <a:avLst/>
+          </a:prstGeom>
+          <a:noFill/>
+          <a:ln w="9525">
+            <a:noFill/>
+            <a:headEnd/>
+            <a:tailEnd/>
+          </a:ln>
+        </p:spPr>
+      </p:pic>
+      <p:sp>
+        <p:nvSpPr>
+          <p:cNvPr id="1" name="TextBox 3"/>
+          <p:cNvSpPr txBox="1"/>
+          <p:nvPr/>
+        </p:nvSpPr>
+        <p:spPr>
+          <a:xfrm>
+            <a:off x="457200" y="5613400"/>
+            <a:ext cx="8229600" cy="508000"/>
+          </a:xfrm>
+          <a:prstGeom prst="rect">
+            <a:avLst/>
+          </a:prstGeom>
+          <a:noFill/>
+        </p:spPr>
+        <p:txBody>
+          <a:bodyPr/>
+          <a:lstStyle/>
+          <a:p>
+            <a:pPr lvl="0" marL="0" indent="0" algn="ctr">
+              <a:buNone/>
+            </a:pPr>
+            <a:r>
+              <a:rPr/>
+              <a:t>Illustration</a:t>
+            </a:r>
+            <a:r>
+              <a:rPr/>
+              <a:t> </a:t>
+            </a:r>
+            <a:r>
+              <a:rPr/>
+              <a:t>of</a:t>
+            </a:r>
+            <a:r>
+              <a:rPr/>
+              <a:t> </a:t>
+            </a:r>
+            <a:r>
+              <a:rPr>
+                <a:hlinkClick r:id="rId4"/>
+              </a:rPr>
+              <a:t>Hamiltonian</a:t>
+            </a:r>
+            <a:r>
+              <a:rPr>
+                <a:hlinkClick r:id="rId5"/>
+              </a:rPr>
+              <a:t> </a:t>
+            </a:r>
+            <a:r>
+              <a:rPr>
+                <a:hlinkClick r:id="rId6"/>
+              </a:rPr>
+              <a:t>Monte</a:t>
+            </a:r>
+            <a:r>
+              <a:rPr>
+                <a:hlinkClick r:id="rId7"/>
+              </a:rPr>
+              <a:t> </a:t>
+            </a:r>
+            <a:r>
+              <a:rPr>
+                <a:hlinkClick r:id="rId8"/>
+              </a:rPr>
+              <a:t>Carlo</a:t>
+            </a:r>
+          </a:p>
+        </p:txBody>
+      </p:sp>
+    </p:spTree>
+  </p:cSld>
+</p:sld>
+</file>
+
 <file path=ppt/slides/slide2.xml><?xml version="1.0" encoding="utf-8"?>
 <p:sld xmlns:a="http://schemas.openxmlformats.org/drawingml/2006/main" xmlns:r="http://schemas.openxmlformats.org/officeDocument/2006/relationships" xmlns:p="http://schemas.openxmlformats.org/presentationml/2006/main">
   <p:cSld>
@@ -12916,7 +13674,7 @@
             </a:pPr>
             <a:r>
               <a:rPr/>
-              <a:t>This presentation will cover some of the historical background for cluster computing and describe a project to illustrate cluster computing in action using several Raspberry Pi computers connected to an Ethernet switch.</a:t>
+              <a:t>This presentation will cover some of the basic concepts and historical background for cluster computing.</a:t>
             </a:r>
           </a:p>
         </p:txBody>

</xml_diff>